<commit_message>
made change to slide 7 in spring powerpoint
</commit_message>
<xml_diff>
--- a/assets/presentations/Spring_Boot_CC.pptx
+++ b/assets/presentations/Spring_Boot_CC.pptx
@@ -135,6 +135,9 @@
           </p14:sldIdLst>
         </p14:section>
       </p14:sectionLst>
+    </p:ext>
+    <p:ext uri="{EFAFB233-063F-42B5-8137-9DF3F51BA10A}">
+      <p15:sldGuideLst xmlns:p15="http://schemas.microsoft.com/office/powerpoint/2012/main"/>
     </p:ext>
   </p:extLst>
 </p:presentation>
@@ -21121,7 +21124,7 @@
                 <a:latin typeface="Calibri" panose="020F0502020204030204" pitchFamily="34" charset="0"/>
                 <a:cs typeface="Calibri" panose="020F0502020204030204" pitchFamily="34" charset="0"/>
               </a:rPr>
-              <a:t> is the middleman between the database and the application. It sends / delivers data to the database.</a:t>
+              <a:t> is the middleman between the database and the application. It sends / retrieves data from the database.</a:t>
             </a:r>
           </a:p>
         </p:txBody>

</xml_diff>